<commit_message>
Update Data/Spark Funds Presentation.pptx
Powerpoint Uploaded
</commit_message>
<xml_diff>
--- a/Data/Spark Funds Presentation.pptx
+++ b/Data/Spark Funds Presentation.pptx
@@ -14,9 +14,9 @@
     <p:sldId id="259" r:id="rId5"/>
     <p:sldId id="260" r:id="rId6"/>
     <p:sldId id="267" r:id="rId7"/>
-    <p:sldId id="262" r:id="rId8"/>
-    <p:sldId id="268" r:id="rId9"/>
-    <p:sldId id="269" r:id="rId10"/>
+    <p:sldId id="270" r:id="rId8"/>
+    <p:sldId id="271" r:id="rId9"/>
+    <p:sldId id="272" r:id="rId10"/>
     <p:sldId id="265" r:id="rId11"/>
   </p:sldIdLst>
   <p:sldSz cx="12192000" cy="6858000"/>
@@ -209,7 +209,7 @@
           <a:p>
             <a:fld id="{2E309023-AF2B-4043-B228-F191CADC9BB1}" type="datetimeFigureOut">
               <a:rPr lang="en-IN" smtClean="0"/>
-              <a:t>06-04-2017</a:t>
+              <a:t>03-11-2018</a:t>
             </a:fld>
             <a:endParaRPr lang="en-IN"/>
           </a:p>
@@ -608,7 +608,7 @@
           <a:p>
             <a:fld id="{70C018FE-C8D6-4A9C-A702-41F1E0C1C452}" type="datetimeFigureOut">
               <a:rPr lang="en-IN" smtClean="0"/>
-              <a:t>06-04-2017</a:t>
+              <a:t>03-11-2018</a:t>
             </a:fld>
             <a:endParaRPr lang="en-IN"/>
           </a:p>
@@ -778,7 +778,7 @@
           <a:p>
             <a:fld id="{70C018FE-C8D6-4A9C-A702-41F1E0C1C452}" type="datetimeFigureOut">
               <a:rPr lang="en-IN" smtClean="0"/>
-              <a:t>06-04-2017</a:t>
+              <a:t>03-11-2018</a:t>
             </a:fld>
             <a:endParaRPr lang="en-IN"/>
           </a:p>
@@ -958,7 +958,7 @@
           <a:p>
             <a:fld id="{70C018FE-C8D6-4A9C-A702-41F1E0C1C452}" type="datetimeFigureOut">
               <a:rPr lang="en-IN" smtClean="0"/>
-              <a:t>06-04-2017</a:t>
+              <a:t>03-11-2018</a:t>
             </a:fld>
             <a:endParaRPr lang="en-IN"/>
           </a:p>
@@ -1390,7 +1390,7 @@
           <a:p>
             <a:fld id="{70C018FE-C8D6-4A9C-A702-41F1E0C1C452}" type="datetimeFigureOut">
               <a:rPr lang="en-IN" smtClean="0"/>
-              <a:t>06-04-2017</a:t>
+              <a:t>03-11-2018</a:t>
             </a:fld>
             <a:endParaRPr lang="en-IN"/>
           </a:p>
@@ -1622,7 +1622,7 @@
           <a:p>
             <a:fld id="{70C018FE-C8D6-4A9C-A702-41F1E0C1C452}" type="datetimeFigureOut">
               <a:rPr lang="en-IN" smtClean="0"/>
-              <a:t>06-04-2017</a:t>
+              <a:t>03-11-2018</a:t>
             </a:fld>
             <a:endParaRPr lang="en-IN"/>
           </a:p>
@@ -1989,7 +1989,7 @@
           <a:p>
             <a:fld id="{70C018FE-C8D6-4A9C-A702-41F1E0C1C452}" type="datetimeFigureOut">
               <a:rPr lang="en-IN" smtClean="0"/>
-              <a:t>06-04-2017</a:t>
+              <a:t>03-11-2018</a:t>
             </a:fld>
             <a:endParaRPr lang="en-IN"/>
           </a:p>
@@ -2107,7 +2107,7 @@
           <a:p>
             <a:fld id="{70C018FE-C8D6-4A9C-A702-41F1E0C1C452}" type="datetimeFigureOut">
               <a:rPr lang="en-IN" smtClean="0"/>
-              <a:t>06-04-2017</a:t>
+              <a:t>03-11-2018</a:t>
             </a:fld>
             <a:endParaRPr lang="en-IN"/>
           </a:p>
@@ -2202,7 +2202,7 @@
           <a:p>
             <a:fld id="{70C018FE-C8D6-4A9C-A702-41F1E0C1C452}" type="datetimeFigureOut">
               <a:rPr lang="en-IN" smtClean="0"/>
-              <a:t>06-04-2017</a:t>
+              <a:t>03-11-2018</a:t>
             </a:fld>
             <a:endParaRPr lang="en-IN"/>
           </a:p>
@@ -2478,7 +2478,7 @@
           <a:p>
             <a:fld id="{70C018FE-C8D6-4A9C-A702-41F1E0C1C452}" type="datetimeFigureOut">
               <a:rPr lang="en-IN" smtClean="0"/>
-              <a:t>06-04-2017</a:t>
+              <a:t>03-11-2018</a:t>
             </a:fld>
             <a:endParaRPr lang="en-IN"/>
           </a:p>
@@ -2735,7 +2735,7 @@
           <a:p>
             <a:fld id="{70C018FE-C8D6-4A9C-A702-41F1E0C1C452}" type="datetimeFigureOut">
               <a:rPr lang="en-IN" smtClean="0"/>
-              <a:t>06-04-2017</a:t>
+              <a:t>03-11-2018</a:t>
             </a:fld>
             <a:endParaRPr lang="en-IN"/>
           </a:p>
@@ -2946,7 +2946,7 @@
           <a:p>
             <a:fld id="{70C018FE-C8D6-4A9C-A702-41F1E0C1C452}" type="datetimeFigureOut">
               <a:rPr lang="en-IN" smtClean="0"/>
-              <a:t>06-04-2017</a:t>
+              <a:t>03-11-2018</a:t>
             </a:fld>
             <a:endParaRPr lang="en-IN" dirty="0"/>
           </a:p>
@@ -3041,7 +3041,7 @@
           <p:nvPr userDrawn="1"/>
         </p:nvPicPr>
         <p:blipFill>
-          <a:blip r:embed="rId13">
+          <a:blip r:embed="rId13" cstate="print">
             <a:extLst>
               <a:ext uri="{28A0092B-C50C-407E-A947-70E740481C1C}">
                 <a14:useLocalDpi xmlns:a14="http://schemas.microsoft.com/office/drawing/2010/main" val="0"/>
@@ -3514,7 +3514,15 @@
             </a:pPr>
             <a:r>
               <a:rPr lang="en-IN" sz="1800" dirty="0"/>
-              <a:t> Member name</a:t>
+              <a:t> </a:t>
+            </a:r>
+            <a:r>
+              <a:rPr lang="en-IN" sz="1800" dirty="0" err="1"/>
+              <a:t>Sweta</a:t>
+            </a:r>
+            <a:r>
+              <a:rPr lang="en-IN" sz="1800" dirty="0"/>
+              <a:t> Kumari</a:t>
             </a:r>
           </a:p>
           <a:p>
@@ -3524,7 +3532,7 @@
             </a:pPr>
             <a:r>
               <a:rPr lang="en-IN" sz="1800" dirty="0"/>
-              <a:t> Member name</a:t>
+              <a:t> Manish Anand</a:t>
             </a:r>
           </a:p>
           <a:p>
@@ -3534,7 +3542,7 @@
             </a:pPr>
             <a:r>
               <a:rPr lang="en-IN" sz="1800" dirty="0"/>
-              <a:t> Member name</a:t>
+              <a:t> Annamalai Ganapathy</a:t>
             </a:r>
           </a:p>
           <a:p>
@@ -3544,8 +3552,21 @@
             </a:pPr>
             <a:r>
               <a:rPr lang="en-IN" sz="1800" dirty="0"/>
-              <a:t> Member name</a:t>
-            </a:r>
+              <a:t> </a:t>
+            </a:r>
+            <a:r>
+              <a:rPr lang="en-IN" sz="1800" dirty="0" err="1"/>
+              <a:t>Jayakrishna</a:t>
+            </a:r>
+            <a:r>
+              <a:rPr lang="en-IN" sz="1800" dirty="0"/>
+              <a:t> </a:t>
+            </a:r>
+            <a:r>
+              <a:rPr lang="en-IN" sz="1800" dirty="0" err="1"/>
+              <a:t>Chakkirala</a:t>
+            </a:r>
+            <a:endParaRPr lang="en-IN" sz="1800" dirty="0"/>
           </a:p>
           <a:p>
             <a:pPr marL="457200" indent="-457200" algn="l">
@@ -3691,6 +3712,82 @@
             <a:pPr marL="0" indent="0">
               <a:buNone/>
             </a:pPr>
+            <a:r>
+              <a:rPr lang="en-IN" sz="1400" dirty="0"/>
+              <a:t>The objective of this case study is facilitate Sparks Funds, an asset management company in making investments on other companies with below constraints:</a:t>
+            </a:r>
+          </a:p>
+          <a:p>
+            <a:r>
+              <a:rPr lang="en-IN" sz="1400" dirty="0"/>
+              <a:t>It can invest </a:t>
+            </a:r>
+            <a:r>
+              <a:rPr lang="en-US" sz="1400" dirty="0"/>
+              <a:t>between 5 to 15 million USD per round of investment.</a:t>
+            </a:r>
+          </a:p>
+          <a:p>
+            <a:r>
+              <a:rPr lang="en-US" sz="1400" dirty="0"/>
+              <a:t>It wants to invest only on English Speaking countries.</a:t>
+            </a:r>
+          </a:p>
+          <a:p>
+            <a:endParaRPr lang="en-US" sz="1400" dirty="0"/>
+          </a:p>
+          <a:p>
+            <a:pPr marL="0" indent="0">
+              <a:buNone/>
+            </a:pPr>
+            <a:r>
+              <a:rPr lang="en-US" sz="1400" dirty="0"/>
+              <a:t>This case study helps Sparks Funds in understanding the market trend for investment by analyzing the below important factors:</a:t>
+            </a:r>
+          </a:p>
+          <a:p>
+            <a:pPr marL="342900" indent="-342900">
+              <a:buAutoNum type="arabicParenR"/>
+            </a:pPr>
+            <a:r>
+              <a:rPr lang="en-US" sz="1400" dirty="0"/>
+              <a:t>Investment Type : This would help in narrowing down the best investment types suited for Sparks Funds to invest as it has constraints of investment amount.</a:t>
+            </a:r>
+          </a:p>
+          <a:p>
+            <a:pPr marL="342900" indent="-342900">
+              <a:buAutoNum type="arabicParenR"/>
+            </a:pPr>
+            <a:r>
+              <a:rPr lang="en-US" sz="1400" dirty="0"/>
+              <a:t>Country : This would help in narrowing down the best suited English speaking countries for investment.</a:t>
+            </a:r>
+          </a:p>
+          <a:p>
+            <a:pPr marL="342900" indent="-342900">
+              <a:buAutoNum type="arabicParenR"/>
+            </a:pPr>
+            <a:r>
+              <a:rPr lang="en-US" sz="1400" dirty="0"/>
+              <a:t>Sectors : This is the main factor for investment as it helps Sparks funds in deciding the main sector and primary sector best suited for investment. 	  	 </a:t>
+            </a:r>
+          </a:p>
+          <a:p>
+            <a:pPr marL="0" indent="0">
+              <a:buNone/>
+            </a:pPr>
+            <a:r>
+              <a:rPr lang="en-US" sz="1400" dirty="0"/>
+              <a:t>All the above factors play key role for Sparks Funds in deciding the company name that it would prefer to invest with the </a:t>
+            </a:r>
+            <a:r>
+              <a:rPr lang="en-US" sz="1400" dirty="0" err="1"/>
+              <a:t>constraints.In</a:t>
+            </a:r>
+            <a:r>
+              <a:rPr lang="en-US" sz="1400" dirty="0"/>
+              <a:t> the end we would have the top 3 countries with the maximum number of investments in each sector.</a:t>
+            </a:r>
             <a:endParaRPr lang="en-IN" sz="1400" dirty="0"/>
           </a:p>
         </p:txBody>
@@ -3758,33 +3855,6 @@
       </p:grpSpPr>
       <p:sp>
         <p:nvSpPr>
-          <p:cNvPr id="3" name="Content Placeholder 2"/>
-          <p:cNvSpPr>
-            <a:spLocks noGrp="1"/>
-          </p:cNvSpPr>
-          <p:nvPr>
-            <p:ph idx="1"/>
-          </p:nvPr>
-        </p:nvSpPr>
-        <p:spPr/>
-        <p:txBody>
-          <a:bodyPr>
-            <a:normAutofit/>
-          </a:bodyPr>
-          <a:lstStyle/>
-          <a:p>
-            <a:pPr marL="0" indent="0">
-              <a:buNone/>
-            </a:pPr>
-            <a:r>
-              <a:rPr lang="en-IN" sz="1800" dirty="0"/>
-              <a:t>Use flow chart</a:t>
-            </a:r>
-          </a:p>
-        </p:txBody>
-      </p:sp>
-      <p:sp>
-        <p:nvSpPr>
           <p:cNvPr id="5" name="Title 1"/>
           <p:cNvSpPr>
             <a:spLocks noGrp="1"/>
@@ -3809,11 +3879,41 @@
             </a:r>
             <a:r>
               <a:rPr lang="en-IN" sz="2800" dirty="0"/>
-              <a:t>&lt;Problem solving methodology&gt;</a:t>
-            </a:r>
-          </a:p>
-        </p:txBody>
-      </p:sp>
+              <a:t>Problem solving methodology:</a:t>
+            </a:r>
+          </a:p>
+        </p:txBody>
+      </p:sp>
+      <p:pic>
+        <p:nvPicPr>
+          <p:cNvPr id="14" name="Picture 13">
+            <a:extLst>
+              <a:ext uri="{FF2B5EF4-FFF2-40B4-BE49-F238E27FC236}">
+                <a16:creationId xmlns:a16="http://schemas.microsoft.com/office/drawing/2014/main" id="{4E7C1A1E-CC81-4FD5-B9AE-F4EE810F8E0C}"/>
+              </a:ext>
+            </a:extLst>
+          </p:cNvPr>
+          <p:cNvPicPr>
+            <a:picLocks noChangeAspect="1"/>
+          </p:cNvPicPr>
+          <p:nvPr/>
+        </p:nvPicPr>
+        <p:blipFill>
+          <a:blip r:embed="rId2"/>
+          <a:stretch>
+            <a:fillRect/>
+          </a:stretch>
+        </p:blipFill>
+        <p:spPr>
+          <a:xfrm>
+            <a:off x="1628781" y="1380392"/>
+            <a:ext cx="4675303" cy="5407268"/>
+          </a:xfrm>
+          <a:prstGeom prst="rect">
+            <a:avLst/>
+          </a:prstGeom>
+        </p:spPr>
+      </p:pic>
     </p:spTree>
     <p:extLst>
       <p:ext uri="{BB962C8B-B14F-4D97-AF65-F5344CB8AC3E}">
@@ -3864,9 +3964,10 @@
               <a:t> </a:t>
             </a:r>
             <a:r>
-              <a:rPr lang="en-IN" sz="2800" dirty="0"/>
-              <a:t>&lt;Analysis&gt;</a:t>
-            </a:r>
+              <a:rPr lang="en-IN" sz="3600" b="1" dirty="0"/>
+              <a:t>Funding Type Analysis</a:t>
+            </a:r>
+            <a:endParaRPr lang="en-IN" sz="3600" dirty="0"/>
           </a:p>
         </p:txBody>
       </p:sp>
@@ -3890,7 +3991,136 @@
             <a:pPr marL="0" indent="0">
               <a:buNone/>
             </a:pPr>
+            <a:r>
+              <a:rPr lang="en-IN" sz="1400" dirty="0"/>
+              <a:t>Steps undertaken for Investment Type Analysis :</a:t>
+            </a:r>
+          </a:p>
+          <a:p>
+            <a:pPr marL="0" indent="0">
+              <a:buNone/>
+            </a:pPr>
+            <a:r>
+              <a:rPr lang="en-IN" sz="1400" dirty="0"/>
+              <a:t>Step 1: Load the data into data frames </a:t>
+            </a:r>
+            <a:r>
+              <a:rPr lang="en-IN" sz="1400" b="1" dirty="0"/>
+              <a:t>companies</a:t>
+            </a:r>
+            <a:r>
+              <a:rPr lang="en-IN" sz="1400" dirty="0"/>
+              <a:t> and </a:t>
+            </a:r>
+            <a:r>
+              <a:rPr lang="en-IN" sz="1400" b="1" dirty="0"/>
+              <a:t>rounds2</a:t>
+            </a:r>
+          </a:p>
+          <a:p>
+            <a:pPr marL="0" indent="0">
+              <a:buNone/>
+            </a:pPr>
+            <a:r>
+              <a:rPr lang="en-IN" sz="1400" dirty="0"/>
+              <a:t>Step 2:</a:t>
+            </a:r>
+            <a:r>
+              <a:rPr lang="en-IN" sz="1400" b="1" dirty="0"/>
+              <a:t> </a:t>
+            </a:r>
+            <a:r>
+              <a:rPr lang="en-IN" sz="1400" dirty="0"/>
+              <a:t>Data cleaning for encoding issues </a:t>
+            </a:r>
+          </a:p>
+          <a:p>
+            <a:pPr marL="0" indent="0">
+              <a:buNone/>
+            </a:pPr>
+            <a:r>
+              <a:rPr lang="en-IN" sz="1400" dirty="0"/>
+              <a:t>Step 3: Create master data frame by merging companies and rounds2 on attribute </a:t>
+            </a:r>
+            <a:r>
+              <a:rPr lang="en-IN" sz="1400" b="1" dirty="0"/>
+              <a:t>permalink</a:t>
+            </a:r>
+            <a:r>
+              <a:rPr lang="en-IN" sz="1400" dirty="0"/>
+              <a:t>/</a:t>
+            </a:r>
+            <a:r>
+              <a:rPr lang="en-IN" sz="1400" b="1" dirty="0"/>
+              <a:t>company_permalink</a:t>
+            </a:r>
+          </a:p>
+          <a:p>
+            <a:pPr marL="0" indent="0">
+              <a:buNone/>
+            </a:pPr>
+            <a:r>
+              <a:rPr lang="en-IN" sz="1400" dirty="0"/>
+              <a:t>Step 4: Clean master data frame to only include companies with no null values for raised_amount</a:t>
+            </a:r>
+          </a:p>
+          <a:p>
+            <a:pPr marL="0" indent="0">
+              <a:buNone/>
+            </a:pPr>
+            <a:r>
+              <a:rPr lang="en-IN" sz="1400" dirty="0"/>
+              <a:t>Step 5: Find the average amount raised by individual funding type</a:t>
+            </a:r>
+          </a:p>
+          <a:p>
+            <a:pPr marL="0" indent="0">
+              <a:buNone/>
+            </a:pPr>
+            <a:r>
+              <a:rPr lang="en-IN" sz="1400" dirty="0"/>
+              <a:t>As Sparks Funds can invest in range of 5 -15 million dollars per round of investment we need </a:t>
+            </a:r>
+            <a:r>
+              <a:rPr lang="en-US" sz="1400" dirty="0"/>
+              <a:t>compare the investment amounts in the venture, seed, angel, private equity etc. As seed/angel funding are for early startups and private equity involves a huge money for investment , </a:t>
+            </a:r>
+            <a:r>
+              <a:rPr lang="en-US" sz="1400" b="1" dirty="0"/>
+              <a:t>Venture</a:t>
+            </a:r>
+            <a:r>
+              <a:rPr lang="en-US" sz="1400" dirty="0"/>
+              <a:t> funding type seems appropriate investment type for Sparks Funds.</a:t>
+            </a:r>
+          </a:p>
+          <a:p>
+            <a:pPr marL="0" indent="0">
+              <a:buNone/>
+            </a:pPr>
             <a:endParaRPr lang="en-IN" sz="1400" dirty="0"/>
+          </a:p>
+          <a:p>
+            <a:pPr marL="0" indent="0">
+              <a:buNone/>
+            </a:pPr>
+            <a:r>
+              <a:rPr lang="en-IN" sz="1400" b="1" dirty="0"/>
+              <a:t>Assumptions : </a:t>
+            </a:r>
+            <a:r>
+              <a:rPr lang="en-IN" sz="1400" dirty="0"/>
+              <a:t>Companies with closed status is also considered in data analysis.</a:t>
+            </a:r>
+          </a:p>
+          <a:p>
+            <a:pPr marL="0" indent="0">
+              <a:buNone/>
+            </a:pPr>
+            <a:endParaRPr lang="en-IN" sz="1400" dirty="0"/>
+          </a:p>
+          <a:p>
+            <a:endParaRPr lang="en-IN" sz="1400" b="1" dirty="0"/>
           </a:p>
         </p:txBody>
       </p:sp>
@@ -3936,36 +4166,161 @@
         </p:nvSpPr>
         <p:spPr/>
         <p:txBody>
-          <a:bodyPr/>
-          <a:lstStyle/>
-          <a:p>
-            <a:r>
-              <a:rPr lang="en-IN" b="1" dirty="0"/>
-              <a:t> </a:t>
-            </a:r>
-            <a:r>
-              <a:rPr lang="en-IN" sz="2800" dirty="0"/>
-              <a:t>&lt;Analysis&gt;</a:t>
-            </a:r>
-          </a:p>
-        </p:txBody>
-      </p:sp>
-      <p:sp>
-        <p:nvSpPr>
-          <p:cNvPr id="3" name="Content Placeholder 2"/>
-          <p:cNvSpPr>
-            <a:spLocks noGrp="1"/>
-          </p:cNvSpPr>
-          <p:nvPr>
-            <p:ph idx="1"/>
-          </p:nvPr>
-        </p:nvSpPr>
-        <p:spPr/>
-        <p:txBody>
           <a:bodyPr>
             <a:normAutofit/>
           </a:bodyPr>
           <a:lstStyle/>
+          <a:p>
+            <a:r>
+              <a:rPr lang="en-IN" sz="3600" b="1" dirty="0"/>
+              <a:t>Country Analysis</a:t>
+            </a:r>
+            <a:endParaRPr lang="en-IN" sz="3600" dirty="0"/>
+          </a:p>
+        </p:txBody>
+      </p:sp>
+      <p:sp>
+        <p:nvSpPr>
+          <p:cNvPr id="3" name="Content Placeholder 2"/>
+          <p:cNvSpPr>
+            <a:spLocks noGrp="1"/>
+          </p:cNvSpPr>
+          <p:nvPr>
+            <p:ph idx="1"/>
+          </p:nvPr>
+        </p:nvSpPr>
+        <p:spPr/>
+        <p:txBody>
+          <a:bodyPr>
+            <a:normAutofit/>
+          </a:bodyPr>
+          <a:lstStyle/>
+          <a:p>
+            <a:pPr marL="0" indent="0">
+              <a:buNone/>
+            </a:pPr>
+            <a:r>
+              <a:rPr lang="en-US" sz="1400" dirty="0"/>
+              <a:t>Spark Funds wants to invest in countries with the highest amount of funding for the chosen investment type.</a:t>
+            </a:r>
+          </a:p>
+          <a:p>
+            <a:pPr marL="0" indent="0">
+              <a:buNone/>
+            </a:pPr>
+            <a:r>
+              <a:rPr lang="en-US" sz="1400" dirty="0"/>
+              <a:t>Step 1: Based on the selected investment type , </a:t>
+            </a:r>
+            <a:r>
+              <a:rPr lang="en-US" sz="1400" dirty="0" err="1"/>
+              <a:t>ie</a:t>
+            </a:r>
+            <a:r>
+              <a:rPr lang="en-US" sz="1400" dirty="0"/>
+              <a:t> Venture type in our case , filter the master data frame.</a:t>
+            </a:r>
+          </a:p>
+          <a:p>
+            <a:pPr marL="0" indent="0">
+              <a:buNone/>
+            </a:pPr>
+            <a:r>
+              <a:rPr lang="en-US" sz="1400" dirty="0"/>
+              <a:t>Step 2: Filter the data frame for only English speaking countries</a:t>
+            </a:r>
+          </a:p>
+          <a:p>
+            <a:pPr marL="0" indent="0">
+              <a:buNone/>
+            </a:pPr>
+            <a:r>
+              <a:rPr lang="en-US" sz="1400" dirty="0"/>
+              <a:t>Step 3: Find the sum of </a:t>
+            </a:r>
+            <a:r>
+              <a:rPr lang="en-US" sz="1400" dirty="0" err="1"/>
+              <a:t>raised_amount</a:t>
+            </a:r>
+            <a:r>
+              <a:rPr lang="en-US" sz="1400" dirty="0"/>
+              <a:t> for each country from the filtered data frame in step 2.</a:t>
+            </a:r>
+          </a:p>
+          <a:p>
+            <a:pPr marL="0" indent="0">
+              <a:buNone/>
+            </a:pPr>
+            <a:r>
+              <a:rPr lang="en-US" sz="1400" dirty="0"/>
+              <a:t>Step 4: Create data frame Top9 for the top 9 countries sorted in ascending order of the amount raised for Venture type funding.</a:t>
+            </a:r>
+          </a:p>
+          <a:p>
+            <a:pPr marL="0" indent="0">
+              <a:buNone/>
+            </a:pPr>
+            <a:r>
+              <a:rPr lang="en-US" sz="1400" dirty="0"/>
+              <a:t>Step 5: Determine the top 3 countries from the data frame Top9</a:t>
+            </a:r>
+          </a:p>
+          <a:p>
+            <a:pPr marL="0" indent="0">
+              <a:buNone/>
+            </a:pPr>
+            <a:r>
+              <a:rPr lang="en-IN" sz="1400" dirty="0"/>
+              <a:t>As Sparks Funds prefers to invest in only English speaking countries, we need </a:t>
+            </a:r>
+            <a:r>
+              <a:rPr lang="en-US" sz="1400" dirty="0"/>
+              <a:t>first filter the English speaking countries from the data frame for investment type Venture and then sort them in ascending order of amounts raised.</a:t>
+            </a:r>
+          </a:p>
+          <a:p>
+            <a:pPr marL="0" indent="0">
+              <a:buNone/>
+            </a:pPr>
+            <a:r>
+              <a:rPr lang="en-US" sz="1400" dirty="0"/>
+              <a:t>Top 3 countries for Sparks Funds potential investment :</a:t>
+            </a:r>
+          </a:p>
+          <a:p>
+            <a:pPr>
+              <a:lnSpc>
+                <a:spcPct val="100000"/>
+              </a:lnSpc>
+            </a:pPr>
+            <a:r>
+              <a:rPr lang="en-US" sz="1400" dirty="0"/>
+              <a:t>USA</a:t>
+            </a:r>
+          </a:p>
+          <a:p>
+            <a:pPr>
+              <a:lnSpc>
+                <a:spcPct val="100000"/>
+              </a:lnSpc>
+            </a:pPr>
+            <a:r>
+              <a:rPr lang="en-US" sz="1400" dirty="0"/>
+              <a:t>Great Britain</a:t>
+            </a:r>
+          </a:p>
+          <a:p>
+            <a:pPr>
+              <a:lnSpc>
+                <a:spcPct val="100000"/>
+              </a:lnSpc>
+            </a:pPr>
+            <a:r>
+              <a:rPr lang="en-US" sz="1400" dirty="0"/>
+              <a:t>India</a:t>
+            </a:r>
+            <a:endParaRPr lang="en-IN" sz="1400" dirty="0"/>
+          </a:p>
           <a:p>
             <a:pPr marL="0" indent="0">
               <a:buNone/>
@@ -4016,16 +4371,14 @@
         </p:nvSpPr>
         <p:spPr/>
         <p:txBody>
-          <a:bodyPr/>
-          <a:lstStyle/>
-          <a:p>
-            <a:r>
-              <a:rPr lang="en-IN" b="1" dirty="0"/>
-              <a:t> </a:t>
-            </a:r>
-            <a:r>
-              <a:rPr lang="en-IN" sz="2800" dirty="0"/>
-              <a:t>&lt;Analysis&gt;</a:t>
+          <a:bodyPr>
+            <a:normAutofit/>
+          </a:bodyPr>
+          <a:lstStyle/>
+          <a:p>
+            <a:r>
+              <a:rPr lang="en-IN" sz="3600" b="1" dirty="0"/>
+              <a:t> Sector Analysis</a:t>
             </a:r>
           </a:p>
         </p:txBody>
@@ -4104,10 +4457,13 @@
             <a:pPr marL="0" indent="0">
               <a:buNone/>
             </a:pPr>
-            <a:r>
-              <a:rPr lang="en-IN" sz="1800" dirty="0"/>
-              <a:t>Plot 1</a:t>
-            </a:r>
+            <a:endParaRPr lang="en-US" sz="1800" b="1" dirty="0"/>
+          </a:p>
+          <a:p>
+            <a:pPr marL="0" indent="0">
+              <a:buNone/>
+            </a:pPr>
+            <a:endParaRPr lang="en-IN" sz="1800" dirty="0"/>
           </a:p>
         </p:txBody>
       </p:sp>
@@ -4123,29 +4479,84 @@
         </p:nvSpPr>
         <p:spPr>
           <a:xfrm>
-            <a:off x="1136469" y="640080"/>
+            <a:off x="404949" y="338532"/>
             <a:ext cx="9313817" cy="856138"/>
           </a:xfrm>
         </p:spPr>
         <p:txBody>
-          <a:bodyPr/>
-          <a:lstStyle/>
-          <a:p>
+          <a:bodyPr>
+            <a:normAutofit fontScale="90000"/>
+          </a:bodyPr>
+          <a:lstStyle/>
+          <a:p>
+            <a:pPr algn="ctr"/>
             <a:r>
               <a:rPr lang="en-IN" b="1" dirty="0"/>
-              <a:t> </a:t>
-            </a:r>
-            <a:r>
-              <a:rPr lang="en-IN" sz="2800" dirty="0"/>
-              <a:t>&lt;Results&gt;</a:t>
-            </a:r>
-          </a:p>
-        </p:txBody>
-      </p:sp>
+              <a:t>Results:</a:t>
+            </a:r>
+            <a:r>
+              <a:rPr lang="en-US" b="1" dirty="0"/>
+              <a:t>Investment Type Analysis</a:t>
+            </a:r>
+            <a:br>
+              <a:rPr lang="en-US" sz="2800" b="1" dirty="0"/>
+            </a:br>
+            <a:endParaRPr lang="en-IN" sz="2800" dirty="0"/>
+          </a:p>
+        </p:txBody>
+      </p:sp>
+      <p:pic>
+        <p:nvPicPr>
+          <p:cNvPr id="2" name="Picture 1"/>
+          <p:cNvPicPr>
+            <a:picLocks noChangeAspect="1"/>
+          </p:cNvPicPr>
+          <p:nvPr/>
+        </p:nvPicPr>
+        <p:blipFill>
+          <a:blip r:embed="rId2"/>
+          <a:stretch>
+            <a:fillRect/>
+          </a:stretch>
+        </p:blipFill>
+        <p:spPr>
+          <a:xfrm>
+            <a:off x="6632619" y="1194670"/>
+            <a:ext cx="4164335" cy="1574907"/>
+          </a:xfrm>
+          <a:prstGeom prst="rect">
+            <a:avLst/>
+          </a:prstGeom>
+        </p:spPr>
+      </p:pic>
+      <p:pic>
+        <p:nvPicPr>
+          <p:cNvPr id="4" name="Picture 3"/>
+          <p:cNvPicPr>
+            <a:picLocks noChangeAspect="1"/>
+          </p:cNvPicPr>
+          <p:nvPr/>
+        </p:nvPicPr>
+        <p:blipFill>
+          <a:blip r:embed="rId3"/>
+          <a:stretch>
+            <a:fillRect/>
+          </a:stretch>
+        </p:blipFill>
+        <p:spPr>
+          <a:xfrm>
+            <a:off x="2116726" y="974795"/>
+            <a:ext cx="4515893" cy="5883205"/>
+          </a:xfrm>
+          <a:prstGeom prst="rect">
+            <a:avLst/>
+          </a:prstGeom>
+        </p:spPr>
+      </p:pic>
     </p:spTree>
     <p:extLst>
       <p:ext uri="{BB962C8B-B14F-4D97-AF65-F5344CB8AC3E}">
-        <p14:creationId xmlns:p14="http://schemas.microsoft.com/office/powerpoint/2010/main" val="1739856806"/>
+        <p14:creationId xmlns:p14="http://schemas.microsoft.com/office/powerpoint/2010/main" val="3927631554"/>
       </p:ext>
     </p:extLst>
   </p:cSld>
@@ -4172,68 +4583,67 @@
           <a:chExt cx="0" cy="0"/>
         </a:xfrm>
       </p:grpSpPr>
-      <p:sp>
-        <p:nvSpPr>
-          <p:cNvPr id="3" name="Content Placeholder 2"/>
-          <p:cNvSpPr>
-            <a:spLocks noGrp="1"/>
-          </p:cNvSpPr>
+      <p:pic>
+        <p:nvPicPr>
+          <p:cNvPr id="2" name="Content Placeholder 1"/>
+          <p:cNvPicPr>
+            <a:picLocks noGrp="1" noChangeAspect="1"/>
+          </p:cNvPicPr>
           <p:nvPr>
             <p:ph idx="1"/>
           </p:nvPr>
-        </p:nvSpPr>
-        <p:spPr/>
+        </p:nvPicPr>
+        <p:blipFill>
+          <a:blip r:embed="rId2"/>
+          <a:stretch>
+            <a:fillRect/>
+          </a:stretch>
+        </p:blipFill>
+        <p:spPr>
+          <a:xfrm>
+            <a:off x="2537138" y="1471088"/>
+            <a:ext cx="7212169" cy="4728100"/>
+          </a:xfrm>
+          <a:prstGeom prst="rect">
+            <a:avLst/>
+          </a:prstGeom>
+        </p:spPr>
+      </p:pic>
+      <p:sp>
+        <p:nvSpPr>
+          <p:cNvPr id="6" name="Title 1"/>
+          <p:cNvSpPr>
+            <a:spLocks noGrp="1"/>
+          </p:cNvSpPr>
+          <p:nvPr>
+            <p:ph type="title"/>
+          </p:nvPr>
+        </p:nvSpPr>
+        <p:spPr>
+          <a:xfrm>
+            <a:off x="934534" y="230743"/>
+            <a:ext cx="7212169" cy="856138"/>
+          </a:xfrm>
+        </p:spPr>
         <p:txBody>
           <a:bodyPr>
             <a:normAutofit/>
           </a:bodyPr>
           <a:lstStyle/>
           <a:p>
-            <a:pPr marL="0" indent="0">
-              <a:buNone/>
-            </a:pPr>
-            <a:r>
-              <a:rPr lang="en-IN" sz="1800" dirty="0"/>
-              <a:t>Plot 2</a:t>
-            </a:r>
-          </a:p>
-        </p:txBody>
-      </p:sp>
-      <p:sp>
-        <p:nvSpPr>
-          <p:cNvPr id="6" name="Title 1"/>
-          <p:cNvSpPr>
-            <a:spLocks noGrp="1"/>
-          </p:cNvSpPr>
-          <p:nvPr>
-            <p:ph type="title"/>
-          </p:nvPr>
-        </p:nvSpPr>
-        <p:spPr>
-          <a:xfrm>
-            <a:off x="1136469" y="640080"/>
-            <a:ext cx="9313817" cy="856138"/>
-          </a:xfrm>
-        </p:spPr>
-        <p:txBody>
-          <a:bodyPr/>
-          <a:lstStyle/>
-          <a:p>
-            <a:r>
-              <a:rPr lang="en-IN" b="1" dirty="0"/>
-              <a:t> </a:t>
-            </a:r>
-            <a:r>
-              <a:rPr lang="en-IN" sz="2800" dirty="0"/>
-              <a:t>&lt;Results&gt;</a:t>
-            </a:r>
+            <a:pPr algn="ctr"/>
+            <a:r>
+              <a:rPr lang="en-US" sz="3600" b="1" dirty="0"/>
+              <a:t>Results: Countries Analysis</a:t>
+            </a:r>
+            <a:endParaRPr lang="en-IN" sz="3600" dirty="0"/>
           </a:p>
         </p:txBody>
       </p:sp>
     </p:spTree>
     <p:extLst>
       <p:ext uri="{BB962C8B-B14F-4D97-AF65-F5344CB8AC3E}">
-        <p14:creationId xmlns:p14="http://schemas.microsoft.com/office/powerpoint/2010/main" val="3733554285"/>
+        <p14:creationId xmlns:p14="http://schemas.microsoft.com/office/powerpoint/2010/main" val="3325009878"/>
       </p:ext>
     </p:extLst>
   </p:cSld>
@@ -4262,33 +4672,6 @@
       </p:grpSpPr>
       <p:sp>
         <p:nvSpPr>
-          <p:cNvPr id="3" name="Content Placeholder 2"/>
-          <p:cNvSpPr>
-            <a:spLocks noGrp="1"/>
-          </p:cNvSpPr>
-          <p:nvPr>
-            <p:ph idx="1"/>
-          </p:nvPr>
-        </p:nvSpPr>
-        <p:spPr/>
-        <p:txBody>
-          <a:bodyPr>
-            <a:normAutofit/>
-          </a:bodyPr>
-          <a:lstStyle/>
-          <a:p>
-            <a:pPr marL="0" indent="0">
-              <a:buNone/>
-            </a:pPr>
-            <a:r>
-              <a:rPr lang="en-IN" sz="1800" dirty="0"/>
-              <a:t>Plot 3</a:t>
-            </a:r>
-          </a:p>
-        </p:txBody>
-      </p:sp>
-      <p:sp>
-        <p:nvSpPr>
           <p:cNvPr id="6" name="Title 1"/>
           <p:cNvSpPr>
             <a:spLocks noGrp="1"/>
@@ -4299,29 +4682,81 @@
         </p:nvSpPr>
         <p:spPr>
           <a:xfrm>
-            <a:off x="1136469" y="640080"/>
-            <a:ext cx="9313817" cy="856138"/>
+            <a:off x="404949" y="302464"/>
+            <a:ext cx="7016261" cy="856138"/>
           </a:xfrm>
         </p:spPr>
         <p:txBody>
+          <a:bodyPr>
+            <a:noAutofit/>
+          </a:bodyPr>
+          <a:lstStyle/>
+          <a:p>
+            <a:pPr algn="ctr"/>
+            <a:r>
+              <a:rPr lang="en-IN" sz="3600" b="1" dirty="0"/>
+              <a:t>Results: </a:t>
+            </a:r>
+            <a:r>
+              <a:rPr lang="en-US" sz="3600" b="1" dirty="0"/>
+              <a:t>Sector Analysis</a:t>
+            </a:r>
+            <a:endParaRPr lang="en-IN" sz="3600" dirty="0"/>
+          </a:p>
+        </p:txBody>
+      </p:sp>
+      <p:sp>
+        <p:nvSpPr>
+          <p:cNvPr id="4" name="Content Placeholder 3"/>
+          <p:cNvSpPr>
+            <a:spLocks noGrp="1"/>
+          </p:cNvSpPr>
+          <p:nvPr>
+            <p:ph idx="1"/>
+          </p:nvPr>
+        </p:nvSpPr>
+        <p:spPr>
+          <a:xfrm>
+            <a:off x="404949" y="1854926"/>
+            <a:ext cx="11404978" cy="4344261"/>
+          </a:xfrm>
+        </p:spPr>
+        <p:txBody>
           <a:bodyPr/>
           <a:lstStyle/>
           <a:p>
-            <a:r>
-              <a:rPr lang="en-IN" b="1" dirty="0"/>
-              <a:t> </a:t>
-            </a:r>
-            <a:r>
-              <a:rPr lang="en-IN" sz="2800" dirty="0"/>
-              <a:t>&lt;Results&gt;</a:t>
-            </a:r>
-          </a:p>
-        </p:txBody>
-      </p:sp>
+            <a:endParaRPr lang="en-US" dirty="0"/>
+          </a:p>
+        </p:txBody>
+      </p:sp>
+      <p:pic>
+        <p:nvPicPr>
+          <p:cNvPr id="5" name="Picture 4"/>
+          <p:cNvPicPr>
+            <a:picLocks noChangeAspect="1"/>
+          </p:cNvPicPr>
+          <p:nvPr/>
+        </p:nvPicPr>
+        <p:blipFill>
+          <a:blip r:embed="rId2"/>
+          <a:stretch>
+            <a:fillRect/>
+          </a:stretch>
+        </p:blipFill>
+        <p:spPr>
+          <a:xfrm>
+            <a:off x="359851" y="1496218"/>
+            <a:ext cx="11355899" cy="3281844"/>
+          </a:xfrm>
+          <a:prstGeom prst="rect">
+            <a:avLst/>
+          </a:prstGeom>
+        </p:spPr>
+      </p:pic>
     </p:spTree>
     <p:extLst>
       <p:ext uri="{BB962C8B-B14F-4D97-AF65-F5344CB8AC3E}">
-        <p14:creationId xmlns:p14="http://schemas.microsoft.com/office/powerpoint/2010/main" val="1057818561"/>
+        <p14:creationId xmlns:p14="http://schemas.microsoft.com/office/powerpoint/2010/main" val="202931655"/>
       </p:ext>
     </p:extLst>
   </p:cSld>

</xml_diff>